<commit_message>
presenta week 4 final
</commit_message>
<xml_diff>
--- a/presentations/week 4/Week 4 - slr.pptx
+++ b/presentations/week 4/Week 4 - slr.pptx
@@ -11,11 +11,12 @@
     <p:sldId id="262" r:id="rId5"/>
     <p:sldId id="260" r:id="rId6"/>
     <p:sldId id="263" r:id="rId7"/>
-    <p:sldId id="257" r:id="rId8"/>
-    <p:sldId id="264" r:id="rId9"/>
-    <p:sldId id="258" r:id="rId10"/>
-    <p:sldId id="259" r:id="rId11"/>
-    <p:sldId id="266" r:id="rId12"/>
+    <p:sldId id="267" r:id="rId8"/>
+    <p:sldId id="257" r:id="rId9"/>
+    <p:sldId id="264" r:id="rId10"/>
+    <p:sldId id="258" r:id="rId11"/>
+    <p:sldId id="259" r:id="rId12"/>
+    <p:sldId id="266" r:id="rId13"/>
   </p:sldIdLst>
   <p:sldSz cx="12192000" cy="6858000"/>
   <p:notesSz cx="6858000" cy="9144000"/>
@@ -3386,6 +3387,65 @@
           <a:bodyPr/>
           <a:lstStyle/>
           <a:p>
+            <a:r>
+              <a:rPr lang="en-US" b="0" i="0" dirty="0">
+                <a:effectLst/>
+                <a:latin typeface="Arial" panose="020B0604020202020204" pitchFamily="34" charset="0"/>
+              </a:rPr>
+              <a:t>Oleg </a:t>
+            </a:r>
+            <a:r>
+              <a:rPr lang="en-US" b="0" i="0" dirty="0" err="1">
+                <a:effectLst/>
+                <a:latin typeface="Arial" panose="020B0604020202020204" pitchFamily="34" charset="0"/>
+              </a:rPr>
+              <a:t>Ostapovich</a:t>
+            </a:r>
+            <a:r>
+              <a:rPr lang="en-US" b="0" i="0" dirty="0">
+                <a:effectLst/>
+                <a:latin typeface="Arial" panose="020B0604020202020204" pitchFamily="34" charset="0"/>
+              </a:rPr>
+              <a:t>, Vladimir Klepikov, Mark </a:t>
+            </a:r>
+            <a:r>
+              <a:rPr lang="en-US" b="0" i="0" dirty="0" err="1">
+                <a:effectLst/>
+                <a:latin typeface="Arial" panose="020B0604020202020204" pitchFamily="34" charset="0"/>
+              </a:rPr>
+              <a:t>Vishnevskiy</a:t>
+            </a:r>
+            <a:r>
+              <a:rPr lang="en-US" b="0" i="0" dirty="0">
+                <a:effectLst/>
+                <a:latin typeface="Arial" panose="020B0604020202020204" pitchFamily="34" charset="0"/>
+              </a:rPr>
+              <a:t>, Amir </a:t>
+            </a:r>
+            <a:r>
+              <a:rPr lang="en-US" b="0" i="0" dirty="0" err="1">
+                <a:effectLst/>
+                <a:latin typeface="Arial" panose="020B0604020202020204" pitchFamily="34" charset="0"/>
+              </a:rPr>
+              <a:t>Zakirov</a:t>
+            </a:r>
+            <a:r>
+              <a:rPr lang="en-US" b="0" i="0" dirty="0">
+                <a:effectLst/>
+                <a:latin typeface="Arial" panose="020B0604020202020204" pitchFamily="34" charset="0"/>
+              </a:rPr>
+              <a:t>, and Abdul Rahman </a:t>
+            </a:r>
+            <a:r>
+              <a:rPr lang="en-US" b="0" i="0" dirty="0" err="1">
+                <a:effectLst/>
+                <a:latin typeface="Arial" panose="020B0604020202020204" pitchFamily="34" charset="0"/>
+              </a:rPr>
+              <a:t>Takriti</a:t>
+            </a:r>
+            <a:endParaRPr lang="ru-RU" dirty="0"/>
+          </a:p>
+          <a:p>
             <a:endParaRPr lang="ru-RU" dirty="0"/>
           </a:p>
         </p:txBody>
@@ -3425,6 +3485,130 @@
           <p:cNvPr id="2" name="Заголовок 1">
             <a:extLst>
               <a:ext uri="{FF2B5EF4-FFF2-40B4-BE49-F238E27FC236}">
+                <a16:creationId xmlns:a16="http://schemas.microsoft.com/office/drawing/2014/main" id="{8066FE85-92D0-4F91-A891-9C4339268096}"/>
+              </a:ext>
+            </a:extLst>
+          </p:cNvPr>
+          <p:cNvSpPr>
+            <a:spLocks noGrp="1"/>
+          </p:cNvSpPr>
+          <p:nvPr>
+            <p:ph type="title"/>
+          </p:nvPr>
+        </p:nvSpPr>
+        <p:spPr/>
+        <p:txBody>
+          <a:bodyPr/>
+          <a:lstStyle/>
+          <a:p>
+            <a:r>
+              <a:rPr lang="en-US" dirty="0"/>
+              <a:t>Main Ideas from articles</a:t>
+            </a:r>
+            <a:endParaRPr lang="ru-RU" dirty="0"/>
+          </a:p>
+        </p:txBody>
+      </p:sp>
+      <p:sp>
+        <p:nvSpPr>
+          <p:cNvPr id="3" name="Объект 2">
+            <a:extLst>
+              <a:ext uri="{FF2B5EF4-FFF2-40B4-BE49-F238E27FC236}">
+                <a16:creationId xmlns:a16="http://schemas.microsoft.com/office/drawing/2014/main" id="{BBAAFB21-2716-40A6-903C-3E9931B0A0BA}"/>
+              </a:ext>
+            </a:extLst>
+          </p:cNvPr>
+          <p:cNvSpPr>
+            <a:spLocks noGrp="1"/>
+          </p:cNvSpPr>
+          <p:nvPr>
+            <p:ph idx="1"/>
+          </p:nvPr>
+        </p:nvSpPr>
+        <p:spPr/>
+        <p:txBody>
+          <a:bodyPr/>
+          <a:lstStyle/>
+          <a:p>
+            <a:pPr marL="0" indent="0">
+              <a:buNone/>
+            </a:pPr>
+            <a:r>
+              <a:rPr lang="en-US" dirty="0"/>
+              <a:t>Generally, we have 3 groups:</a:t>
+            </a:r>
+          </a:p>
+          <a:p>
+            <a:r>
+              <a:rPr lang="en-US" dirty="0"/>
+              <a:t>First group – LiDAR and camera combination for precision improvement and data calibration</a:t>
+            </a:r>
+          </a:p>
+          <a:p>
+            <a:r>
+              <a:rPr lang="en-US" dirty="0"/>
+              <a:t>Second – GPS, camera, LiDAR data combining for SLAM</a:t>
+            </a:r>
+          </a:p>
+          <a:p>
+            <a:r>
+              <a:rPr lang="en-US" dirty="0"/>
+              <a:t>Third – algorithms comparison</a:t>
+            </a:r>
+            <a:endParaRPr lang="ru-RU" dirty="0"/>
+          </a:p>
+          <a:p>
+            <a:pPr marL="0" indent="0">
+              <a:buNone/>
+            </a:pPr>
+            <a:r>
+              <a:rPr lang="en-US" dirty="0"/>
+              <a:t>Technically, we found many algorithms for out task, so, we can assemble data for our research</a:t>
+            </a:r>
+          </a:p>
+          <a:p>
+            <a:pPr marL="0" indent="0">
+              <a:buNone/>
+            </a:pPr>
+            <a:endParaRPr lang="en-US" dirty="0"/>
+          </a:p>
+        </p:txBody>
+      </p:sp>
+    </p:spTree>
+    <p:extLst>
+      <p:ext uri="{BB962C8B-B14F-4D97-AF65-F5344CB8AC3E}">
+        <p14:creationId xmlns:p14="http://schemas.microsoft.com/office/powerpoint/2010/main" val="1162946608"/>
+      </p:ext>
+    </p:extLst>
+  </p:cSld>
+  <p:clrMapOvr>
+    <a:masterClrMapping/>
+  </p:clrMapOvr>
+</p:sld>
+</file>
+
+<file path=ppt/slides/slide11.xml><?xml version="1.0" encoding="utf-8"?>
+<p:sld xmlns:a="http://schemas.openxmlformats.org/drawingml/2006/main" xmlns:r="http://schemas.openxmlformats.org/officeDocument/2006/relationships" xmlns:p="http://schemas.openxmlformats.org/presentationml/2006/main">
+  <p:cSld>
+    <p:spTree>
+      <p:nvGrpSpPr>
+        <p:cNvPr id="1" name=""/>
+        <p:cNvGrpSpPr/>
+        <p:nvPr/>
+      </p:nvGrpSpPr>
+      <p:grpSpPr>
+        <a:xfrm>
+          <a:off x="0" y="0"/>
+          <a:ext cx="0" cy="0"/>
+          <a:chOff x="0" y="0"/>
+          <a:chExt cx="0" cy="0"/>
+        </a:xfrm>
+      </p:grpSpPr>
+      <p:sp>
+        <p:nvSpPr>
+          <p:cNvPr id="2" name="Заголовок 1">
+            <a:extLst>
+              <a:ext uri="{FF2B5EF4-FFF2-40B4-BE49-F238E27FC236}">
                 <a16:creationId xmlns:a16="http://schemas.microsoft.com/office/drawing/2014/main" id="{C0AFEFDC-C571-42D7-9170-48884B4D4A62}"/>
               </a:ext>
             </a:extLst>
@@ -3470,10 +3654,77 @@
           <a:bodyPr/>
           <a:lstStyle/>
           <a:p>
+            <a:pPr marL="0" indent="0">
+              <a:buNone/>
+            </a:pPr>
+            <a:r>
+              <a:rPr lang="en-US" dirty="0"/>
+              <a:t>Now we have git with our notes and Obsidian ideas draft</a:t>
+            </a:r>
             <a:endParaRPr lang="ru-RU" dirty="0"/>
           </a:p>
         </p:txBody>
       </p:sp>
+      <p:pic>
+        <p:nvPicPr>
+          <p:cNvPr id="5" name="Рисунок 4">
+            <a:extLst>
+              <a:ext uri="{FF2B5EF4-FFF2-40B4-BE49-F238E27FC236}">
+                <a16:creationId xmlns:a16="http://schemas.microsoft.com/office/drawing/2014/main" id="{4D56362F-4EC5-4824-9259-684B0EC95E44}"/>
+              </a:ext>
+            </a:extLst>
+          </p:cNvPr>
+          <p:cNvPicPr>
+            <a:picLocks noChangeAspect="1"/>
+          </p:cNvPicPr>
+          <p:nvPr/>
+        </p:nvPicPr>
+        <p:blipFill>
+          <a:blip r:embed="rId2"/>
+          <a:stretch>
+            <a:fillRect/>
+          </a:stretch>
+        </p:blipFill>
+        <p:spPr>
+          <a:xfrm>
+            <a:off x="1033852" y="2713481"/>
+            <a:ext cx="3461301" cy="3184397"/>
+          </a:xfrm>
+          <a:prstGeom prst="rect">
+            <a:avLst/>
+          </a:prstGeom>
+        </p:spPr>
+      </p:pic>
+      <p:pic>
+        <p:nvPicPr>
+          <p:cNvPr id="7" name="Рисунок 6">
+            <a:extLst>
+              <a:ext uri="{FF2B5EF4-FFF2-40B4-BE49-F238E27FC236}">
+                <a16:creationId xmlns:a16="http://schemas.microsoft.com/office/drawing/2014/main" id="{88E2520B-1875-4740-A306-3C56C25667CE}"/>
+              </a:ext>
+            </a:extLst>
+          </p:cNvPr>
+          <p:cNvPicPr>
+            <a:picLocks noChangeAspect="1"/>
+          </p:cNvPicPr>
+          <p:nvPr/>
+        </p:nvPicPr>
+        <p:blipFill>
+          <a:blip r:embed="rId3"/>
+          <a:stretch>
+            <a:fillRect/>
+          </a:stretch>
+        </p:blipFill>
+        <p:spPr>
+          <a:xfrm>
+            <a:off x="6602680" y="2713481"/>
+            <a:ext cx="3461301" cy="3248951"/>
+          </a:xfrm>
+          <a:prstGeom prst="rect">
+            <a:avLst/>
+          </a:prstGeom>
+        </p:spPr>
+      </p:pic>
     </p:spTree>
     <p:extLst>
       <p:ext uri="{BB962C8B-B14F-4D97-AF65-F5344CB8AC3E}">
@@ -3487,7 +3738,7 @@
 </p:sld>
 </file>
 
-<file path=ppt/slides/slide11.xml><?xml version="1.0" encoding="utf-8"?>
+<file path=ppt/slides/slide12.xml><?xml version="1.0" encoding="utf-8"?>
 <p:sld xmlns:a="http://schemas.openxmlformats.org/drawingml/2006/main" xmlns:r="http://schemas.openxmlformats.org/officeDocument/2006/relationships" xmlns:p="http://schemas.openxmlformats.org/presentationml/2006/main">
   <p:cSld>
     <p:spTree>
@@ -3637,18 +3888,282 @@
             <p:ph idx="1"/>
           </p:nvPr>
         </p:nvSpPr>
-        <p:spPr/>
-        <p:txBody>
-          <a:bodyPr/>
-          <a:lstStyle/>
-          <a:p>
+        <p:spPr>
+          <a:xfrm>
+            <a:off x="838200" y="1825625"/>
+            <a:ext cx="10515600" cy="2004168"/>
+          </a:xfrm>
+        </p:spPr>
+        <p:txBody>
+          <a:bodyPr numCol="1">
+            <a:normAutofit/>
+          </a:bodyPr>
+          <a:lstStyle/>
+          <a:p>
+            <a:pPr marL="0" indent="0">
+              <a:buNone/>
+            </a:pPr>
             <a:r>
               <a:rPr lang="en-US" dirty="0"/>
-              <a:t>SLAM, visual odometry, LiDAR odometry, UAV, navigation, sensor fusion, mapping, LGBT camera</a:t>
-            </a:r>
-          </a:p>
-          <a:p>
+              <a:t>Theme: LiDAR and Visual Odometry Methods in Simultaneous Localization and Mapping for Unmanned Aerial Vehicles</a:t>
+            </a:r>
+          </a:p>
+          <a:p>
+            <a:pPr marL="0" indent="0">
+              <a:buNone/>
+            </a:pPr>
+            <a:endParaRPr lang="en-US" dirty="0"/>
+          </a:p>
+          <a:p>
+            <a:pPr marL="0" indent="0">
+              <a:buNone/>
+            </a:pPr>
+            <a:r>
+              <a:rPr lang="en-US" dirty="0"/>
+              <a:t>Keywords:</a:t>
+            </a:r>
             <a:endParaRPr lang="ru-RU" dirty="0"/>
+          </a:p>
+        </p:txBody>
+      </p:sp>
+      <p:sp>
+        <p:nvSpPr>
+          <p:cNvPr id="4" name="Объект 2">
+            <a:extLst>
+              <a:ext uri="{FF2B5EF4-FFF2-40B4-BE49-F238E27FC236}">
+                <a16:creationId xmlns:a16="http://schemas.microsoft.com/office/drawing/2014/main" id="{3079D734-63DD-438A-B043-8AF1D240B4BD}"/>
+              </a:ext>
+            </a:extLst>
+          </p:cNvPr>
+          <p:cNvSpPr txBox="1">
+            <a:spLocks/>
+          </p:cNvSpPr>
+          <p:nvPr/>
+        </p:nvSpPr>
+        <p:spPr>
+          <a:xfrm>
+            <a:off x="838200" y="3829793"/>
+            <a:ext cx="10515600" cy="2265857"/>
+          </a:xfrm>
+          <a:prstGeom prst="rect">
+            <a:avLst/>
+          </a:prstGeom>
+        </p:spPr>
+        <p:txBody>
+          <a:bodyPr vert="horz" lIns="91440" tIns="45720" rIns="91440" bIns="45720" numCol="2" rtlCol="0">
+            <a:normAutofit/>
+          </a:bodyPr>
+          <a:lstStyle>
+            <a:lvl1pPr marL="228600" indent="-228600" algn="l" defTabSz="914400" rtl="0" eaLnBrk="1" latinLnBrk="0" hangingPunct="1">
+              <a:lnSpc>
+                <a:spcPct val="90000"/>
+              </a:lnSpc>
+              <a:spcBef>
+                <a:spcPts val="1000"/>
+              </a:spcBef>
+              <a:buFont typeface="Arial" panose="020B0604020202020204" pitchFamily="34" charset="0"/>
+              <a:buChar char="•"/>
+              <a:defRPr sz="2800" kern="1200">
+                <a:solidFill>
+                  <a:schemeClr val="tx1"/>
+                </a:solidFill>
+                <a:latin typeface="+mn-lt"/>
+                <a:ea typeface="+mn-ea"/>
+                <a:cs typeface="+mn-cs"/>
+              </a:defRPr>
+            </a:lvl1pPr>
+            <a:lvl2pPr marL="685800" indent="-228600" algn="l" defTabSz="914400" rtl="0" eaLnBrk="1" latinLnBrk="0" hangingPunct="1">
+              <a:lnSpc>
+                <a:spcPct val="90000"/>
+              </a:lnSpc>
+              <a:spcBef>
+                <a:spcPts val="500"/>
+              </a:spcBef>
+              <a:buFont typeface="Arial" panose="020B0604020202020204" pitchFamily="34" charset="0"/>
+              <a:buChar char="•"/>
+              <a:defRPr sz="2400" kern="1200">
+                <a:solidFill>
+                  <a:schemeClr val="tx1"/>
+                </a:solidFill>
+                <a:latin typeface="+mn-lt"/>
+                <a:ea typeface="+mn-ea"/>
+                <a:cs typeface="+mn-cs"/>
+              </a:defRPr>
+            </a:lvl2pPr>
+            <a:lvl3pPr marL="1143000" indent="-228600" algn="l" defTabSz="914400" rtl="0" eaLnBrk="1" latinLnBrk="0" hangingPunct="1">
+              <a:lnSpc>
+                <a:spcPct val="90000"/>
+              </a:lnSpc>
+              <a:spcBef>
+                <a:spcPts val="500"/>
+              </a:spcBef>
+              <a:buFont typeface="Arial" panose="020B0604020202020204" pitchFamily="34" charset="0"/>
+              <a:buChar char="•"/>
+              <a:defRPr sz="2000" kern="1200">
+                <a:solidFill>
+                  <a:schemeClr val="tx1"/>
+                </a:solidFill>
+                <a:latin typeface="+mn-lt"/>
+                <a:ea typeface="+mn-ea"/>
+                <a:cs typeface="+mn-cs"/>
+              </a:defRPr>
+            </a:lvl3pPr>
+            <a:lvl4pPr marL="1600200" indent="-228600" algn="l" defTabSz="914400" rtl="0" eaLnBrk="1" latinLnBrk="0" hangingPunct="1">
+              <a:lnSpc>
+                <a:spcPct val="90000"/>
+              </a:lnSpc>
+              <a:spcBef>
+                <a:spcPts val="500"/>
+              </a:spcBef>
+              <a:buFont typeface="Arial" panose="020B0604020202020204" pitchFamily="34" charset="0"/>
+              <a:buChar char="•"/>
+              <a:defRPr sz="1800" kern="1200">
+                <a:solidFill>
+                  <a:schemeClr val="tx1"/>
+                </a:solidFill>
+                <a:latin typeface="+mn-lt"/>
+                <a:ea typeface="+mn-ea"/>
+                <a:cs typeface="+mn-cs"/>
+              </a:defRPr>
+            </a:lvl4pPr>
+            <a:lvl5pPr marL="2057400" indent="-228600" algn="l" defTabSz="914400" rtl="0" eaLnBrk="1" latinLnBrk="0" hangingPunct="1">
+              <a:lnSpc>
+                <a:spcPct val="90000"/>
+              </a:lnSpc>
+              <a:spcBef>
+                <a:spcPts val="500"/>
+              </a:spcBef>
+              <a:buFont typeface="Arial" panose="020B0604020202020204" pitchFamily="34" charset="0"/>
+              <a:buChar char="•"/>
+              <a:defRPr sz="1800" kern="1200">
+                <a:solidFill>
+                  <a:schemeClr val="tx1"/>
+                </a:solidFill>
+                <a:latin typeface="+mn-lt"/>
+                <a:ea typeface="+mn-ea"/>
+                <a:cs typeface="+mn-cs"/>
+              </a:defRPr>
+            </a:lvl5pPr>
+            <a:lvl6pPr marL="2514600" indent="-228600" algn="l" defTabSz="914400" rtl="0" eaLnBrk="1" latinLnBrk="0" hangingPunct="1">
+              <a:lnSpc>
+                <a:spcPct val="90000"/>
+              </a:lnSpc>
+              <a:spcBef>
+                <a:spcPts val="500"/>
+              </a:spcBef>
+              <a:buFont typeface="Arial" panose="020B0604020202020204" pitchFamily="34" charset="0"/>
+              <a:buChar char="•"/>
+              <a:defRPr sz="1800" kern="1200">
+                <a:solidFill>
+                  <a:schemeClr val="tx1"/>
+                </a:solidFill>
+                <a:latin typeface="+mn-lt"/>
+                <a:ea typeface="+mn-ea"/>
+                <a:cs typeface="+mn-cs"/>
+              </a:defRPr>
+            </a:lvl6pPr>
+            <a:lvl7pPr marL="2971800" indent="-228600" algn="l" defTabSz="914400" rtl="0" eaLnBrk="1" latinLnBrk="0" hangingPunct="1">
+              <a:lnSpc>
+                <a:spcPct val="90000"/>
+              </a:lnSpc>
+              <a:spcBef>
+                <a:spcPts val="500"/>
+              </a:spcBef>
+              <a:buFont typeface="Arial" panose="020B0604020202020204" pitchFamily="34" charset="0"/>
+              <a:buChar char="•"/>
+              <a:defRPr sz="1800" kern="1200">
+                <a:solidFill>
+                  <a:schemeClr val="tx1"/>
+                </a:solidFill>
+                <a:latin typeface="+mn-lt"/>
+                <a:ea typeface="+mn-ea"/>
+                <a:cs typeface="+mn-cs"/>
+              </a:defRPr>
+            </a:lvl7pPr>
+            <a:lvl8pPr marL="3429000" indent="-228600" algn="l" defTabSz="914400" rtl="0" eaLnBrk="1" latinLnBrk="0" hangingPunct="1">
+              <a:lnSpc>
+                <a:spcPct val="90000"/>
+              </a:lnSpc>
+              <a:spcBef>
+                <a:spcPts val="500"/>
+              </a:spcBef>
+              <a:buFont typeface="Arial" panose="020B0604020202020204" pitchFamily="34" charset="0"/>
+              <a:buChar char="•"/>
+              <a:defRPr sz="1800" kern="1200">
+                <a:solidFill>
+                  <a:schemeClr val="tx1"/>
+                </a:solidFill>
+                <a:latin typeface="+mn-lt"/>
+                <a:ea typeface="+mn-ea"/>
+                <a:cs typeface="+mn-cs"/>
+              </a:defRPr>
+            </a:lvl8pPr>
+            <a:lvl9pPr marL="3886200" indent="-228600" algn="l" defTabSz="914400" rtl="0" eaLnBrk="1" latinLnBrk="0" hangingPunct="1">
+              <a:lnSpc>
+                <a:spcPct val="90000"/>
+              </a:lnSpc>
+              <a:spcBef>
+                <a:spcPts val="500"/>
+              </a:spcBef>
+              <a:buFont typeface="Arial" panose="020B0604020202020204" pitchFamily="34" charset="0"/>
+              <a:buChar char="•"/>
+              <a:defRPr sz="1800" kern="1200">
+                <a:solidFill>
+                  <a:schemeClr val="tx1"/>
+                </a:solidFill>
+                <a:latin typeface="+mn-lt"/>
+                <a:ea typeface="+mn-ea"/>
+                <a:cs typeface="+mn-cs"/>
+              </a:defRPr>
+            </a:lvl9pPr>
+          </a:lstStyle>
+          <a:p>
+            <a:r>
+              <a:rPr lang="en-US" dirty="0"/>
+              <a:t>SLAM</a:t>
+            </a:r>
+          </a:p>
+          <a:p>
+            <a:r>
+              <a:rPr lang="en-US" dirty="0"/>
+              <a:t>visual odometry</a:t>
+            </a:r>
+          </a:p>
+          <a:p>
+            <a:r>
+              <a:rPr lang="en-US" dirty="0"/>
+              <a:t>LiDAR odometry</a:t>
+            </a:r>
+          </a:p>
+          <a:p>
+            <a:r>
+              <a:rPr lang="en-US" dirty="0"/>
+              <a:t>UAV</a:t>
+            </a:r>
+          </a:p>
+          <a:p>
+            <a:r>
+              <a:rPr lang="en-US" dirty="0"/>
+              <a:t>Navigation</a:t>
+            </a:r>
+          </a:p>
+          <a:p>
+            <a:r>
+              <a:rPr lang="en-US" dirty="0"/>
+              <a:t>sensor fusion</a:t>
+            </a:r>
+          </a:p>
+          <a:p>
+            <a:r>
+              <a:rPr lang="en-US" dirty="0"/>
+              <a:t>Mapping</a:t>
+            </a:r>
+          </a:p>
+          <a:p>
+            <a:r>
+              <a:rPr lang="en-US" dirty="0"/>
+              <a:t>RGB camera</a:t>
+            </a:r>
           </a:p>
         </p:txBody>
       </p:sp>
@@ -4155,7 +4670,7 @@
           <p:cNvPr id="2" name="Заголовок 1">
             <a:extLst>
               <a:ext uri="{FF2B5EF4-FFF2-40B4-BE49-F238E27FC236}">
-                <a16:creationId xmlns:a16="http://schemas.microsoft.com/office/drawing/2014/main" id="{6AD7568F-1885-4895-8117-5C6AFABF26E5}"/>
+                <a16:creationId xmlns:a16="http://schemas.microsoft.com/office/drawing/2014/main" id="{AA2A80E9-028A-4383-B26C-3A1BA9FBA363}"/>
               </a:ext>
             </a:extLst>
           </p:cNvPr>
@@ -4173,7 +4688,7 @@
           <a:p>
             <a:r>
               <a:rPr lang="en-US" dirty="0"/>
-              <a:t>Reviewed Articles</a:t>
+              <a:t>Database we use</a:t>
             </a:r>
             <a:endParaRPr lang="ru-RU" dirty="0"/>
           </a:p>
@@ -4184,7 +4699,7 @@
           <p:cNvPr id="3" name="Объект 2">
             <a:extLst>
               <a:ext uri="{FF2B5EF4-FFF2-40B4-BE49-F238E27FC236}">
-                <a16:creationId xmlns:a16="http://schemas.microsoft.com/office/drawing/2014/main" id="{8BD9A526-2C62-4878-A9AA-469D5E1F347A}"/>
+                <a16:creationId xmlns:a16="http://schemas.microsoft.com/office/drawing/2014/main" id="{DCC78F9C-7586-4614-8CEE-37FACEAC2290}"/>
               </a:ext>
             </a:extLst>
           </p:cNvPr>
@@ -4201,125 +4716,21 @@
           <a:lstStyle/>
           <a:p>
             <a:r>
-              <a:rPr lang="en-US" sz="1800" b="0" i="0" u="none" strike="noStrike" dirty="0">
-                <a:solidFill>
-                  <a:srgbClr val="000000"/>
-                </a:solidFill>
-                <a:effectLst/>
-                <a:latin typeface="Calibri" panose="020F0502020204030204" pitchFamily="34" charset="0"/>
-              </a:rPr>
-              <a:t>A portable UAV-based laser-induced fluorescence lidar system for oil pollution and aquatic environment monitoring</a:t>
-            </a:r>
-          </a:p>
-          <a:p>
-            <a:r>
-              <a:rPr lang="en-US" sz="1800" b="0" i="0" u="none" strike="noStrike" dirty="0">
-                <a:solidFill>
-                  <a:srgbClr val="000000"/>
-                </a:solidFill>
-                <a:effectLst/>
-                <a:latin typeface="Calibri" panose="020F0502020204030204" pitchFamily="34" charset="0"/>
-              </a:rPr>
-              <a:t>Potential of UAV-based sun-induced chlorophyll fluorescence to detect water stress in sugar beet</a:t>
-            </a:r>
-            <a:endParaRPr lang="en-US" sz="1800" dirty="0">
-              <a:solidFill>
-                <a:srgbClr val="000000"/>
-              </a:solidFill>
-              <a:latin typeface="Calibri" panose="020F0502020204030204" pitchFamily="34" charset="0"/>
-            </a:endParaRPr>
-          </a:p>
-          <a:p>
-            <a:r>
-              <a:rPr lang="en-US" sz="1800" b="0" i="0" u="none" strike="noStrike" dirty="0">
-                <a:solidFill>
-                  <a:srgbClr val="000000"/>
-                </a:solidFill>
-                <a:effectLst/>
-                <a:latin typeface="Calibri" panose="020F0502020204030204" pitchFamily="34" charset="0"/>
-              </a:rPr>
-              <a:t>Experimental tests and radiometric calculations for the feasibility of fluorescence LIDAR-based discrimination of oil spills from UAV</a:t>
-            </a:r>
-          </a:p>
-          <a:p>
-            <a:r>
-              <a:rPr lang="en-US" sz="1800" b="0" i="0" u="none" strike="noStrike" dirty="0">
-                <a:solidFill>
-                  <a:srgbClr val="000000"/>
-                </a:solidFill>
-                <a:effectLst/>
-                <a:latin typeface="Calibri" panose="020F0502020204030204" pitchFamily="34" charset="0"/>
-              </a:rPr>
-              <a:t>A Comparison of LiDAR-based SLAM Systems for Control of Unmanned Aerial Vehicles</a:t>
-            </a:r>
-          </a:p>
-          <a:p>
-            <a:r>
-              <a:rPr lang="en-US" sz="1800" b="0" i="0" u="none" strike="noStrike" dirty="0">
-                <a:solidFill>
-                  <a:srgbClr val="000000"/>
-                </a:solidFill>
-                <a:effectLst/>
-                <a:latin typeface="Calibri" panose="020F0502020204030204" pitchFamily="34" charset="0"/>
-              </a:rPr>
-              <a:t>RTLIO: Real-Time LiDAR-Inertial Odometry and Mapping for UAVs</a:t>
-            </a:r>
-            <a:endParaRPr lang="en-US" sz="1800" dirty="0">
-              <a:solidFill>
-                <a:srgbClr val="000000"/>
-              </a:solidFill>
-              <a:latin typeface="Calibri" panose="020F0502020204030204" pitchFamily="34" charset="0"/>
-            </a:endParaRPr>
-          </a:p>
-          <a:p>
-            <a:r>
-              <a:rPr lang="en-US" sz="1800" b="0" i="0" u="none" strike="noStrike" dirty="0">
-                <a:solidFill>
-                  <a:srgbClr val="000000"/>
-                </a:solidFill>
-                <a:effectLst/>
-                <a:latin typeface="Calibri" panose="020F0502020204030204" pitchFamily="34" charset="0"/>
-              </a:rPr>
-              <a:t>VIRAL SLAM: Tightly Coupled Camera-IMU-UWB-Lidar SLAM</a:t>
-            </a:r>
-          </a:p>
-          <a:p>
-            <a:r>
-              <a:rPr lang="en-US" sz="1800" b="0" i="0" u="none" strike="noStrike" dirty="0">
-                <a:solidFill>
-                  <a:srgbClr val="000000"/>
-                </a:solidFill>
-                <a:effectLst/>
-                <a:latin typeface="Calibri" panose="020F0502020204030204" pitchFamily="34" charset="0"/>
-              </a:rPr>
-              <a:t>Tightly-coupled camera/LiDAR integration for point cloud generation from GNSS/INS-assisted UAV mapping systems</a:t>
-            </a:r>
-            <a:endParaRPr lang="en-US" sz="1800" dirty="0">
-              <a:solidFill>
-                <a:srgbClr val="000000"/>
-              </a:solidFill>
-              <a:latin typeface="Calibri" panose="020F0502020204030204" pitchFamily="34" charset="0"/>
-            </a:endParaRPr>
-          </a:p>
-          <a:p>
-            <a:r>
-              <a:rPr lang="en-US" sz="1800" b="0" i="0" u="none" strike="noStrike" dirty="0">
-                <a:solidFill>
-                  <a:srgbClr val="000000"/>
-                </a:solidFill>
-                <a:effectLst/>
-                <a:latin typeface="Calibri" panose="020F0502020204030204" pitchFamily="34" charset="0"/>
-              </a:rPr>
-              <a:t>Robust Autonomous Landing of UAV in Non-Cooperative Environments based on Dynamic Time Camera-LiDAR Fusion</a:t>
-            </a:r>
-            <a:endParaRPr lang="en-US" sz="1800" dirty="0">
-              <a:solidFill>
-                <a:srgbClr val="000000"/>
-              </a:solidFill>
-              <a:latin typeface="Calibri" panose="020F0502020204030204" pitchFamily="34" charset="0"/>
-            </a:endParaRPr>
-          </a:p>
-          <a:p>
+              <a:rPr lang="en-US" dirty="0"/>
+              <a:t>Google Scholar</a:t>
+            </a:r>
+          </a:p>
+          <a:p>
+            <a:r>
+              <a:rPr lang="en-US" dirty="0"/>
+              <a:t>Science Direct</a:t>
+            </a:r>
+          </a:p>
+          <a:p>
+            <a:r>
+              <a:rPr lang="en-US" dirty="0"/>
+              <a:t>Research Gate</a:t>
+            </a:r>
             <a:endParaRPr lang="ru-RU" dirty="0"/>
           </a:p>
         </p:txBody>
@@ -4327,7 +4738,7 @@
     </p:spTree>
     <p:extLst>
       <p:ext uri="{BB962C8B-B14F-4D97-AF65-F5344CB8AC3E}">
-        <p14:creationId xmlns:p14="http://schemas.microsoft.com/office/powerpoint/2010/main" val="3738380718"/>
+        <p14:creationId xmlns:p14="http://schemas.microsoft.com/office/powerpoint/2010/main" val="1544717153"/>
       </p:ext>
     </p:extLst>
   </p:cSld>
@@ -4412,7 +4823,7 @@
                 <a:effectLst/>
                 <a:latin typeface="Calibri" panose="020F0502020204030204" pitchFamily="34" charset="0"/>
               </a:rPr>
-              <a:t>DV-LOAM: Direct Visual LiDAR Odometry and Mapping</a:t>
+              <a:t>A portable UAV-based laser-induced fluorescence lidar system for oil pollution and aquatic environment monitoring</a:t>
             </a:r>
           </a:p>
           <a:p>
@@ -4424,8 +4835,106 @@
                 <a:effectLst/>
                 <a:latin typeface="Calibri" panose="020F0502020204030204" pitchFamily="34" charset="0"/>
               </a:rPr>
-              <a:t>R3LIVE: A Robust, Real-time, RGB-colored, LiDAR-Inertial-Visual tightly-coupled state Estimation and mapping package</a:t>
-            </a:r>
+              <a:t>Potential of UAV-based sun-induced chlorophyll fluorescence to detect water stress in sugar beet</a:t>
+            </a:r>
+            <a:endParaRPr lang="en-US" sz="1800" dirty="0">
+              <a:solidFill>
+                <a:srgbClr val="000000"/>
+              </a:solidFill>
+              <a:latin typeface="Calibri" panose="020F0502020204030204" pitchFamily="34" charset="0"/>
+            </a:endParaRPr>
+          </a:p>
+          <a:p>
+            <a:r>
+              <a:rPr lang="en-US" sz="1800" b="0" i="0" u="none" strike="noStrike" dirty="0">
+                <a:solidFill>
+                  <a:srgbClr val="000000"/>
+                </a:solidFill>
+                <a:effectLst/>
+                <a:latin typeface="Calibri" panose="020F0502020204030204" pitchFamily="34" charset="0"/>
+              </a:rPr>
+              <a:t>Experimental tests and radiometric calculations for the feasibility of fluorescence LIDAR-based discrimination of oil spills from UAV</a:t>
+            </a:r>
+          </a:p>
+          <a:p>
+            <a:r>
+              <a:rPr lang="en-US" sz="1800" b="0" i="0" u="none" strike="noStrike" dirty="0">
+                <a:solidFill>
+                  <a:srgbClr val="000000"/>
+                </a:solidFill>
+                <a:effectLst/>
+                <a:latin typeface="Calibri" panose="020F0502020204030204" pitchFamily="34" charset="0"/>
+              </a:rPr>
+              <a:t>A Comparison of LiDAR-based SLAM Systems for Control of Unmanned Aerial Vehicles</a:t>
+            </a:r>
+          </a:p>
+          <a:p>
+            <a:r>
+              <a:rPr lang="en-US" sz="1800" b="0" i="0" u="none" strike="noStrike" dirty="0">
+                <a:solidFill>
+                  <a:srgbClr val="000000"/>
+                </a:solidFill>
+                <a:effectLst/>
+                <a:latin typeface="Calibri" panose="020F0502020204030204" pitchFamily="34" charset="0"/>
+              </a:rPr>
+              <a:t>RTLIO: Real-Time LiDAR-Inertial Odometry and Mapping for UAVs</a:t>
+            </a:r>
+            <a:endParaRPr lang="en-US" sz="1800" dirty="0">
+              <a:solidFill>
+                <a:srgbClr val="000000"/>
+              </a:solidFill>
+              <a:latin typeface="Calibri" panose="020F0502020204030204" pitchFamily="34" charset="0"/>
+            </a:endParaRPr>
+          </a:p>
+          <a:p>
+            <a:r>
+              <a:rPr lang="en-US" sz="1800" b="0" i="0" u="none" strike="noStrike" dirty="0">
+                <a:solidFill>
+                  <a:srgbClr val="000000"/>
+                </a:solidFill>
+                <a:effectLst/>
+                <a:latin typeface="Calibri" panose="020F0502020204030204" pitchFamily="34" charset="0"/>
+              </a:rPr>
+              <a:t>VIRAL SLAM: Tightly Coupled Camera-IMU-UWB-Lidar SLAM</a:t>
+            </a:r>
+          </a:p>
+          <a:p>
+            <a:r>
+              <a:rPr lang="en-US" sz="1800" b="0" i="0" u="none" strike="noStrike" dirty="0">
+                <a:solidFill>
+                  <a:srgbClr val="000000"/>
+                </a:solidFill>
+                <a:effectLst/>
+                <a:latin typeface="Calibri" panose="020F0502020204030204" pitchFamily="34" charset="0"/>
+              </a:rPr>
+              <a:t>Tightly-coupled camera/LiDAR integration for point cloud generation from GNSS/INS-assisted UAV mapping systems</a:t>
+            </a:r>
+            <a:endParaRPr lang="en-US" sz="1800" dirty="0">
+              <a:solidFill>
+                <a:srgbClr val="000000"/>
+              </a:solidFill>
+              <a:latin typeface="Calibri" panose="020F0502020204030204" pitchFamily="34" charset="0"/>
+            </a:endParaRPr>
+          </a:p>
+          <a:p>
+            <a:r>
+              <a:rPr lang="en-US" sz="1800" b="0" i="0" u="none" strike="noStrike" dirty="0">
+                <a:solidFill>
+                  <a:srgbClr val="000000"/>
+                </a:solidFill>
+                <a:effectLst/>
+                <a:latin typeface="Calibri" panose="020F0502020204030204" pitchFamily="34" charset="0"/>
+              </a:rPr>
+              <a:t>Robust Autonomous Landing of UAV in Non-Cooperative Environments based on Dynamic Time Camera-LiDAR Fusion</a:t>
+            </a:r>
+            <a:endParaRPr lang="en-US" sz="1800" dirty="0">
+              <a:solidFill>
+                <a:srgbClr val="000000"/>
+              </a:solidFill>
+              <a:latin typeface="Calibri" panose="020F0502020204030204" pitchFamily="34" charset="0"/>
+            </a:endParaRPr>
+          </a:p>
+          <a:p>
             <a:endParaRPr lang="ru-RU" dirty="0"/>
           </a:p>
         </p:txBody>
@@ -4433,7 +4942,7 @@
     </p:spTree>
     <p:extLst>
       <p:ext uri="{BB962C8B-B14F-4D97-AF65-F5344CB8AC3E}">
-        <p14:creationId xmlns:p14="http://schemas.microsoft.com/office/powerpoint/2010/main" val="1646582070"/>
+        <p14:creationId xmlns:p14="http://schemas.microsoft.com/office/powerpoint/2010/main" val="3738380718"/>
       </p:ext>
     </p:extLst>
   </p:cSld>
@@ -4465,7 +4974,7 @@
           <p:cNvPr id="2" name="Заголовок 1">
             <a:extLst>
               <a:ext uri="{FF2B5EF4-FFF2-40B4-BE49-F238E27FC236}">
-                <a16:creationId xmlns:a16="http://schemas.microsoft.com/office/drawing/2014/main" id="{8066FE85-92D0-4F91-A891-9C4339268096}"/>
+                <a16:creationId xmlns:a16="http://schemas.microsoft.com/office/drawing/2014/main" id="{6AD7568F-1885-4895-8117-5C6AFABF26E5}"/>
               </a:ext>
             </a:extLst>
           </p:cNvPr>
@@ -4483,7 +4992,7 @@
           <a:p>
             <a:r>
               <a:rPr lang="en-US" dirty="0"/>
-              <a:t>Main Ideas from articles</a:t>
+              <a:t>Reviewed Articles</a:t>
             </a:r>
             <a:endParaRPr lang="ru-RU" dirty="0"/>
           </a:p>
@@ -4494,7 +5003,7 @@
           <p:cNvPr id="3" name="Объект 2">
             <a:extLst>
               <a:ext uri="{FF2B5EF4-FFF2-40B4-BE49-F238E27FC236}">
-                <a16:creationId xmlns:a16="http://schemas.microsoft.com/office/drawing/2014/main" id="{BBAAFB21-2716-40A6-903C-3E9931B0A0BA}"/>
+                <a16:creationId xmlns:a16="http://schemas.microsoft.com/office/drawing/2014/main" id="{8BD9A526-2C62-4878-A9AA-469D5E1F347A}"/>
               </a:ext>
             </a:extLst>
           </p:cNvPr>
@@ -4510,14 +5019,102 @@
           <a:bodyPr/>
           <a:lstStyle/>
           <a:p>
-            <a:endParaRPr lang="ru-RU"/>
+            <a:r>
+              <a:rPr lang="en-US" sz="1800" b="0" i="0" u="none" strike="noStrike" dirty="0">
+                <a:solidFill>
+                  <a:srgbClr val="000000"/>
+                </a:solidFill>
+                <a:effectLst/>
+                <a:latin typeface="Calibri" panose="020F0502020204030204" pitchFamily="34" charset="0"/>
+              </a:rPr>
+              <a:t>DV-LOAM: Direct Visual LiDAR Odometry and Mapping</a:t>
+            </a:r>
+          </a:p>
+          <a:p>
+            <a:r>
+              <a:rPr lang="en-US" sz="1800" b="0" i="0" u="none" strike="noStrike" dirty="0">
+                <a:solidFill>
+                  <a:srgbClr val="000000"/>
+                </a:solidFill>
+                <a:effectLst/>
+                <a:latin typeface="Calibri" panose="020F0502020204030204" pitchFamily="34" charset="0"/>
+              </a:rPr>
+              <a:t>R3LIVE: A Robust, Real-time, RGB-colored, LiDAR-Inertial-Visual tightly-coupled state Estimation and mapping package</a:t>
+            </a:r>
+          </a:p>
+          <a:p>
+            <a:r>
+              <a:rPr lang="en-US" sz="1800" b="0" i="0" u="none" strike="noStrike" dirty="0">
+                <a:solidFill>
+                  <a:srgbClr val="000000"/>
+                </a:solidFill>
+                <a:effectLst/>
+                <a:latin typeface="Calibri" panose="020F0502020204030204" pitchFamily="34" charset="0"/>
+              </a:rPr>
+              <a:t>Robust GNSS-denied localization for UAV using particle filter and visual odometer</a:t>
+            </a:r>
+            <a:endParaRPr lang="en-US" sz="1800" dirty="0">
+              <a:solidFill>
+                <a:srgbClr val="000000"/>
+              </a:solidFill>
+              <a:latin typeface="Calibri" panose="020F0502020204030204" pitchFamily="34" charset="0"/>
+            </a:endParaRPr>
+          </a:p>
+          <a:p>
+            <a:r>
+              <a:rPr lang="en-US" sz="1800" b="0" i="0" u="none" strike="noStrike" dirty="0">
+                <a:solidFill>
+                  <a:srgbClr val="000000"/>
+                </a:solidFill>
+                <a:effectLst/>
+                <a:latin typeface="Calibri" panose="020F0502020204030204" pitchFamily="34" charset="0"/>
+              </a:rPr>
+              <a:t>FAST-LIO: A Fast, Robust LiDAR-inertial Odometry Package by Tightly-Coupled Iterated Kalman Filter</a:t>
+            </a:r>
+          </a:p>
+          <a:p>
+            <a:r>
+              <a:rPr lang="en-US" sz="1800" b="0" i="0" u="none" strike="noStrike" dirty="0">
+                <a:solidFill>
+                  <a:srgbClr val="000000"/>
+                </a:solidFill>
+                <a:effectLst/>
+                <a:latin typeface="Calibri" panose="020F0502020204030204" pitchFamily="34" charset="0"/>
+              </a:rPr>
+              <a:t>Review of SLAM Algorithms for Indoor Mobile Robot with LIDAR and RGB-D Camera Technology</a:t>
+            </a:r>
+          </a:p>
+          <a:p>
+            <a:r>
+              <a:rPr lang="en-US" sz="1800" b="0" i="0" u="none" strike="noStrike" dirty="0">
+                <a:solidFill>
+                  <a:srgbClr val="000000"/>
+                </a:solidFill>
+                <a:effectLst/>
+                <a:latin typeface="Calibri" panose="020F0502020204030204" pitchFamily="34" charset="0"/>
+              </a:rPr>
+              <a:t>A General Optimization-based Framework for Global Pose Estimation with Multiple Sensors</a:t>
+            </a:r>
+          </a:p>
+          <a:p>
+            <a:r>
+              <a:rPr lang="en-US" sz="1800" b="0" i="0" u="none" strike="noStrike" dirty="0">
+                <a:solidFill>
+                  <a:srgbClr val="000000"/>
+                </a:solidFill>
+                <a:effectLst/>
+                <a:latin typeface="Calibri" panose="020F0502020204030204" pitchFamily="34" charset="0"/>
+              </a:rPr>
+              <a:t>A GNSS/INS/LiDAR Integration Scheme for UAV-Based Navigation in GNSS-Challenging Environments</a:t>
+            </a:r>
+            <a:endParaRPr lang="ru-RU" dirty="0"/>
           </a:p>
         </p:txBody>
       </p:sp>
     </p:spTree>
     <p:extLst>
       <p:ext uri="{BB962C8B-B14F-4D97-AF65-F5344CB8AC3E}">
-        <p14:creationId xmlns:p14="http://schemas.microsoft.com/office/powerpoint/2010/main" val="1162946608"/>
+        <p14:creationId xmlns:p14="http://schemas.microsoft.com/office/powerpoint/2010/main" val="1646582070"/>
       </p:ext>
     </p:extLst>
   </p:cSld>

</xml_diff>